<commit_message>
Modified Day2 - Supporting Materials
</commit_message>
<xml_diff>
--- a/Day 2/Slides/6. Working with Collections/working-with-collections-slides.pptx
+++ b/Day 2/Slides/6. Working with Collections/working-with-collections-slides.pptx
@@ -16878,7 +16878,7 @@
         </p:nvGraphicFramePr>
         <p:xfrm>
           <a:off x="9652000" y="4040742"/>
-          <a:ext cx="2249170" cy="1002665"/>
+          <a:ext cx="2247900" cy="1002030"/>
         </p:xfrm>
         <a:graphic>
           <a:graphicData uri="http://schemas.openxmlformats.org/drawingml/2006/table">
@@ -16892,7 +16892,7 @@
                 <a:gridCol w="271779"/>
                 <a:gridCol w="784860"/>
               </a:tblGrid>
-              <a:tr h="326004">
+              <a:tr h="325755">
                 <a:tc>
                   <a:txBody>
                     <a:bodyPr/>

</xml_diff>